<commit_message>
minor changes on pptx
</commit_message>
<xml_diff>
--- a/CCFachtagung/HM-Computergrafik-Gruppe10.pptx
+++ b/CCFachtagung/HM-Computergrafik-Gruppe10.pptx
@@ -124,7 +124,7 @@
   </p:defaultTextStyle>
   <p:extLst>
     <p:ext uri="{521415D9-36F7-43E2-AB2F-B90AF26B5E84}">
-      <p14:sectionLst xmlns:p14="http://schemas.microsoft.com/office/powerpoint/2010/main">
+      <p14:sectionLst xmlns:p14="http://schemas.microsoft.com/office/powerpoint/2010/main" xmlns="">
         <p14:section name="Willkommen" id="{E75E278A-FF0E-49A4-B170-79828D63BBAD}">
           <p14:sldIdLst>
             <p14:sldId id="256"/>
@@ -145,7 +145,7 @@
       </p14:sectionLst>
     </p:ext>
     <p:ext uri="{EFAFB233-063F-42B5-8137-9DF3F51BA10A}">
-      <p15:sldGuideLst xmlns:p15="http://schemas.microsoft.com/office/powerpoint/2012/main">
+      <p15:sldGuideLst xmlns:p15="http://schemas.microsoft.com/office/powerpoint/2012/main" xmlns="">
         <p15:guide id="1" orient="horz" pos="2160" userDrawn="1">
           <p15:clr>
             <a:srgbClr val="A4A3A4"/>
@@ -169,7 +169,7 @@
       </p15:sldGuideLst>
     </p:ext>
     <p:ext uri="{2D200454-40CA-4A62-9FC3-DE9A4176ACB9}">
-      <p15:notesGuideLst xmlns:p15="http://schemas.microsoft.com/office/powerpoint/2012/main"/>
+      <p15:notesGuideLst xmlns:p15="http://schemas.microsoft.com/office/powerpoint/2012/main" xmlns=""/>
     </p:ext>
   </p:extLst>
 </p:presentation>
@@ -264,7 +264,7 @@
             <a:fld id="{8C9146D8-245D-48F7-A30A-38B58300ABAD}" type="datetimeFigureOut">
               <a:rPr lang="de-DE" smtClean="0"/>
               <a:pPr/>
-              <a:t>06.04.2019</a:t>
+              <a:t>07.04.2019</a:t>
             </a:fld>
             <a:endParaRPr lang="de-DE" dirty="0"/>
           </a:p>
@@ -340,7 +340,7 @@
     </p:spTree>
     <p:extLst>
       <p:ext uri="{BB962C8B-B14F-4D97-AF65-F5344CB8AC3E}">
-        <p14:creationId xmlns:p14="http://schemas.microsoft.com/office/powerpoint/2010/main" val="2341799096"/>
+        <p14:creationId xmlns:p14="http://schemas.microsoft.com/office/powerpoint/2010/main" xmlns="" val="2341799096"/>
       </p:ext>
     </p:extLst>
   </p:cSld>
@@ -432,7 +432,7 @@
             <a:fld id="{EC13577B-6902-467D-A26C-08A0DD5E4E03}" type="datetimeFigureOut">
               <a:rPr lang="de-DE" smtClean="0"/>
               <a:pPr/>
-              <a:t>06.04.2019</a:t>
+              <a:t>07.04.2019</a:t>
             </a:fld>
             <a:endParaRPr lang="de-DE" dirty="0"/>
           </a:p>
@@ -600,7 +600,7 @@
     </p:spTree>
     <p:extLst>
       <p:ext uri="{BB962C8B-B14F-4D97-AF65-F5344CB8AC3E}">
-        <p14:creationId xmlns:p14="http://schemas.microsoft.com/office/powerpoint/2010/main" val="3381910297"/>
+        <p14:creationId xmlns:p14="http://schemas.microsoft.com/office/powerpoint/2010/main" xmlns="" val="3381910297"/>
       </p:ext>
     </p:extLst>
   </p:cSld>
@@ -793,7 +793,7 @@
     </p:spTree>
     <p:extLst>
       <p:ext uri="{BB962C8B-B14F-4D97-AF65-F5344CB8AC3E}">
-        <p14:creationId xmlns:p14="http://schemas.microsoft.com/office/powerpoint/2010/main" val="1011769815"/>
+        <p14:creationId xmlns:p14="http://schemas.microsoft.com/office/powerpoint/2010/main" xmlns="" val="1011769815"/>
       </p:ext>
     </p:extLst>
   </p:cSld>
@@ -848,12 +848,12 @@
           <a:effectLst/>
           <a:extLst>
             <a:ext uri="{909E8E84-426E-40DD-AFC4-6F175D3DCCD1}">
-              <a14:hiddenFill xmlns:a14="http://schemas.microsoft.com/office/drawing/2010/main">
+              <a14:hiddenFill xmlns:a14="http://schemas.microsoft.com/office/drawing/2010/main" xmlns="">
                 <a:noFill/>
               </a14:hiddenFill>
             </a:ext>
             <a:ext uri="{AF507438-7753-43E0-B8FC-AC1667EBCBE1}">
-              <a14:hiddenEffects xmlns:a14="http://schemas.microsoft.com/office/drawing/2010/main">
+              <a14:hiddenEffects xmlns:a14="http://schemas.microsoft.com/office/drawing/2010/main" xmlns="">
                 <a:effectLst>
                   <a:outerShdw dist="35921" dir="2700000" algn="ctr" rotWithShape="0">
                     <a:schemeClr val="bg2"/>
@@ -899,12 +899,12 @@
           <a:effectLst/>
           <a:extLst>
             <a:ext uri="{909E8E84-426E-40DD-AFC4-6F175D3DCCD1}">
-              <a14:hiddenFill xmlns:a14="http://schemas.microsoft.com/office/drawing/2010/main">
+              <a14:hiddenFill xmlns:a14="http://schemas.microsoft.com/office/drawing/2010/main" xmlns="">
                 <a:noFill/>
               </a14:hiddenFill>
             </a:ext>
             <a:ext uri="{AF507438-7753-43E0-B8FC-AC1667EBCBE1}">
-              <a14:hiddenEffects xmlns:a14="http://schemas.microsoft.com/office/drawing/2010/main">
+              <a14:hiddenEffects xmlns:a14="http://schemas.microsoft.com/office/drawing/2010/main" xmlns="">
                 <a:effectLst>
                   <a:outerShdw dist="35921" dir="2700000" algn="ctr" rotWithShape="0">
                     <a:schemeClr val="bg2"/>
@@ -947,7 +947,7 @@
           <a:effectLst/>
           <a:extLst>
             <a:ext uri="{91240B29-F687-4F45-9708-019B960494DF}">
-              <a14:hiddenLine xmlns:a14="http://schemas.microsoft.com/office/drawing/2010/main" w="12700" cap="sq">
+              <a14:hiddenLine xmlns:a14="http://schemas.microsoft.com/office/drawing/2010/main" xmlns="" w="12700" cap="sq">
                 <a:solidFill>
                   <a:schemeClr val="tx1"/>
                 </a:solidFill>
@@ -957,7 +957,7 @@
               </a14:hiddenLine>
             </a:ext>
             <a:ext uri="{AF507438-7753-43E0-B8FC-AC1667EBCBE1}">
-              <a14:hiddenEffects xmlns:a14="http://schemas.microsoft.com/office/drawing/2010/main">
+              <a14:hiddenEffects xmlns:a14="http://schemas.microsoft.com/office/drawing/2010/main" xmlns="">
                 <a:effectLst>
                   <a:outerShdw dist="35921" dir="2700000" algn="ctr" rotWithShape="0">
                     <a:schemeClr val="bg2"/>
@@ -1100,7 +1100,7 @@
           <a:effectLst/>
           <a:extLst>
             <a:ext uri="{91240B29-F687-4F45-9708-019B960494DF}">
-              <a14:hiddenLine xmlns:a14="http://schemas.microsoft.com/office/drawing/2010/main" w="12700" cap="sq">
+              <a14:hiddenLine xmlns:a14="http://schemas.microsoft.com/office/drawing/2010/main" xmlns="" w="12700" cap="sq">
                 <a:solidFill>
                   <a:schemeClr val="tx1"/>
                 </a:solidFill>
@@ -1110,7 +1110,7 @@
               </a14:hiddenLine>
             </a:ext>
             <a:ext uri="{AF507438-7753-43E0-B8FC-AC1667EBCBE1}">
-              <a14:hiddenEffects xmlns:a14="http://schemas.microsoft.com/office/drawing/2010/main">
+              <a14:hiddenEffects xmlns:a14="http://schemas.microsoft.com/office/drawing/2010/main" xmlns="">
                 <a:effectLst>
                   <a:outerShdw dist="35921" dir="2700000" algn="ctr" rotWithShape="0">
                     <a:schemeClr val="bg2"/>
@@ -1256,12 +1256,12 @@
           <a:effectLst/>
           <a:extLst>
             <a:ext uri="{909E8E84-426E-40DD-AFC4-6F175D3DCCD1}">
-              <a14:hiddenFill xmlns:a14="http://schemas.microsoft.com/office/drawing/2010/main">
+              <a14:hiddenFill xmlns:a14="http://schemas.microsoft.com/office/drawing/2010/main" xmlns="">
                 <a:noFill/>
               </a14:hiddenFill>
             </a:ext>
             <a:ext uri="{AF507438-7753-43E0-B8FC-AC1667EBCBE1}">
-              <a14:hiddenEffects xmlns:a14="http://schemas.microsoft.com/office/drawing/2010/main">
+              <a14:hiddenEffects xmlns:a14="http://schemas.microsoft.com/office/drawing/2010/main" xmlns="">
                 <a:effectLst>
                   <a:outerShdw dist="35921" dir="2700000" algn="ctr" rotWithShape="0">
                     <a:schemeClr val="bg2"/>
@@ -1432,7 +1432,7 @@
           <a:blip r:embed="rId2" cstate="screen">
             <a:extLst>
               <a:ext uri="{28A0092B-C50C-407E-A947-70E740481C1C}">
-                <a14:useLocalDpi xmlns:a14="http://schemas.microsoft.com/office/drawing/2010/main"/>
+                <a14:useLocalDpi xmlns:a14="http://schemas.microsoft.com/office/drawing/2010/main" xmlns=""/>
               </a:ext>
             </a:extLst>
           </a:blip>
@@ -1452,7 +1452,7 @@
           <a:noFill/>
           <a:extLst>
             <a:ext uri="{909E8E84-426E-40DD-AFC4-6F175D3DCCD1}">
-              <a14:hiddenFill xmlns:a14="http://schemas.microsoft.com/office/drawing/2010/main">
+              <a14:hiddenFill xmlns:a14="http://schemas.microsoft.com/office/drawing/2010/main" xmlns="">
                 <a:solidFill>
                   <a:srgbClr val="FFFFFF"/>
                 </a:solidFill>
@@ -1464,7 +1464,7 @@
     </p:spTree>
     <p:extLst>
       <p:ext uri="{BB962C8B-B14F-4D97-AF65-F5344CB8AC3E}">
-        <p14:creationId xmlns:p14="http://schemas.microsoft.com/office/powerpoint/2010/main" val="2421047883"/>
+        <p14:creationId xmlns:p14="http://schemas.microsoft.com/office/powerpoint/2010/main" xmlns="" val="2421047883"/>
       </p:ext>
     </p:extLst>
   </p:cSld>
@@ -1770,7 +1770,7 @@
     </p:spTree>
     <p:extLst>
       <p:ext uri="{BB962C8B-B14F-4D97-AF65-F5344CB8AC3E}">
-        <p14:creationId xmlns:p14="http://schemas.microsoft.com/office/powerpoint/2010/main" val="2040427316"/>
+        <p14:creationId xmlns:p14="http://schemas.microsoft.com/office/powerpoint/2010/main" xmlns="" val="2040427316"/>
       </p:ext>
     </p:extLst>
   </p:cSld>
@@ -2075,7 +2075,7 @@
     </p:spTree>
     <p:extLst>
       <p:ext uri="{BB962C8B-B14F-4D97-AF65-F5344CB8AC3E}">
-        <p14:creationId xmlns:p14="http://schemas.microsoft.com/office/powerpoint/2010/main" val="1102150429"/>
+        <p14:creationId xmlns:p14="http://schemas.microsoft.com/office/powerpoint/2010/main" xmlns="" val="1102150429"/>
       </p:ext>
     </p:extLst>
   </p:cSld>
@@ -2810,7 +2810,7 @@
     </p:spTree>
     <p:extLst>
       <p:ext uri="{BB962C8B-B14F-4D97-AF65-F5344CB8AC3E}">
-        <p14:creationId xmlns:p14="http://schemas.microsoft.com/office/powerpoint/2010/main" val="754523509"/>
+        <p14:creationId xmlns:p14="http://schemas.microsoft.com/office/powerpoint/2010/main" xmlns="" val="754523509"/>
       </p:ext>
     </p:extLst>
   </p:cSld>
@@ -3057,7 +3057,7 @@
     </p:spTree>
     <p:extLst>
       <p:ext uri="{BB962C8B-B14F-4D97-AF65-F5344CB8AC3E}">
-        <p14:creationId xmlns:p14="http://schemas.microsoft.com/office/powerpoint/2010/main" val="1463398460"/>
+        <p14:creationId xmlns:p14="http://schemas.microsoft.com/office/powerpoint/2010/main" xmlns="" val="1463398460"/>
       </p:ext>
     </p:extLst>
   </p:cSld>
@@ -4008,7 +4008,7 @@
     </p:spTree>
     <p:extLst>
       <p:ext uri="{BB962C8B-B14F-4D97-AF65-F5344CB8AC3E}">
-        <p14:creationId xmlns:p14="http://schemas.microsoft.com/office/powerpoint/2010/main" val="324478463"/>
+        <p14:creationId xmlns:p14="http://schemas.microsoft.com/office/powerpoint/2010/main" xmlns="" val="324478463"/>
       </p:ext>
     </p:extLst>
   </p:cSld>
@@ -4235,7 +4235,7 @@
     </p:spTree>
     <p:extLst>
       <p:ext uri="{BB962C8B-B14F-4D97-AF65-F5344CB8AC3E}">
-        <p14:creationId xmlns:p14="http://schemas.microsoft.com/office/powerpoint/2010/main" val="2721063157"/>
+        <p14:creationId xmlns:p14="http://schemas.microsoft.com/office/powerpoint/2010/main" xmlns="" val="2721063157"/>
       </p:ext>
     </p:extLst>
   </p:cSld>
@@ -4410,7 +4410,7 @@
     </p:spTree>
     <p:extLst>
       <p:ext uri="{BB962C8B-B14F-4D97-AF65-F5344CB8AC3E}">
-        <p14:creationId xmlns:p14="http://schemas.microsoft.com/office/powerpoint/2010/main" val="3042046981"/>
+        <p14:creationId xmlns:p14="http://schemas.microsoft.com/office/powerpoint/2010/main" xmlns="" val="3042046981"/>
       </p:ext>
     </p:extLst>
   </p:cSld>
@@ -4500,7 +4500,7 @@
     </p:spTree>
     <p:extLst>
       <p:ext uri="{BB962C8B-B14F-4D97-AF65-F5344CB8AC3E}">
-        <p14:creationId xmlns:p14="http://schemas.microsoft.com/office/powerpoint/2010/main" val="994477509"/>
+        <p14:creationId xmlns:p14="http://schemas.microsoft.com/office/powerpoint/2010/main" xmlns="" val="994477509"/>
       </p:ext>
     </p:extLst>
   </p:cSld>
@@ -5020,7 +5020,7 @@
     </p:spTree>
     <p:extLst>
       <p:ext uri="{BB962C8B-B14F-4D97-AF65-F5344CB8AC3E}">
-        <p14:creationId xmlns:p14="http://schemas.microsoft.com/office/powerpoint/2010/main" val="896812924"/>
+        <p14:creationId xmlns:p14="http://schemas.microsoft.com/office/powerpoint/2010/main" xmlns="" val="896812924"/>
       </p:ext>
     </p:extLst>
   </p:cSld>
@@ -5192,7 +5192,7 @@
     </p:spTree>
     <p:extLst>
       <p:ext uri="{BB962C8B-B14F-4D97-AF65-F5344CB8AC3E}">
-        <p14:creationId xmlns:p14="http://schemas.microsoft.com/office/powerpoint/2010/main" val="409431034"/>
+        <p14:creationId xmlns:p14="http://schemas.microsoft.com/office/powerpoint/2010/main" xmlns="" val="409431034"/>
       </p:ext>
     </p:extLst>
   </p:cSld>
@@ -5849,7 +5849,7 @@
     </p:spTree>
     <p:extLst>
       <p:ext uri="{BB962C8B-B14F-4D97-AF65-F5344CB8AC3E}">
-        <p14:creationId xmlns:p14="http://schemas.microsoft.com/office/powerpoint/2010/main" val="2661314862"/>
+        <p14:creationId xmlns:p14="http://schemas.microsoft.com/office/powerpoint/2010/main" xmlns="" val="2661314862"/>
       </p:ext>
     </p:extLst>
   </p:cSld>
@@ -5880,7 +5880,7 @@
     </p:spTree>
     <p:extLst>
       <p:ext uri="{BB962C8B-B14F-4D97-AF65-F5344CB8AC3E}">
-        <p14:creationId xmlns:p14="http://schemas.microsoft.com/office/powerpoint/2010/main" val="1901171200"/>
+        <p14:creationId xmlns:p14="http://schemas.microsoft.com/office/powerpoint/2010/main" xmlns="" val="1901171200"/>
       </p:ext>
     </p:extLst>
   </p:cSld>
@@ -6273,7 +6273,7 @@
     </p:spTree>
     <p:extLst>
       <p:ext uri="{BB962C8B-B14F-4D97-AF65-F5344CB8AC3E}">
-        <p14:creationId xmlns:p14="http://schemas.microsoft.com/office/powerpoint/2010/main" val="1398083682"/>
+        <p14:creationId xmlns:p14="http://schemas.microsoft.com/office/powerpoint/2010/main" xmlns="" val="1398083682"/>
       </p:ext>
     </p:extLst>
   </p:cSld>
@@ -6520,7 +6520,7 @@
     </p:spTree>
     <p:extLst>
       <p:ext uri="{BB962C8B-B14F-4D97-AF65-F5344CB8AC3E}">
-        <p14:creationId xmlns:p14="http://schemas.microsoft.com/office/powerpoint/2010/main" val="726974761"/>
+        <p14:creationId xmlns:p14="http://schemas.microsoft.com/office/powerpoint/2010/main" xmlns="" val="726974761"/>
       </p:ext>
     </p:extLst>
   </p:cSld>
@@ -6580,7 +6580,7 @@
           <a:effectLst/>
           <a:extLst>
             <a:ext uri="{909E8E84-426E-40DD-AFC4-6F175D3DCCD1}">
-              <a14:hiddenFill xmlns:a14="http://schemas.microsoft.com/office/drawing/2010/main">
+              <a14:hiddenFill xmlns:a14="http://schemas.microsoft.com/office/drawing/2010/main" xmlns="">
                 <a:gradFill rotWithShape="0">
                   <a:gsLst>
                     <a:gs pos="0">
@@ -6597,7 +6597,7 @@
               </a14:hiddenFill>
             </a:ext>
             <a:ext uri="{91240B29-F687-4F45-9708-019B960494DF}">
-              <a14:hiddenLine xmlns:a14="http://schemas.microsoft.com/office/drawing/2010/main" w="9525">
+              <a14:hiddenLine xmlns:a14="http://schemas.microsoft.com/office/drawing/2010/main" xmlns="" w="9525">
                 <a:solidFill>
                   <a:schemeClr val="tx1"/>
                 </a:solidFill>
@@ -6607,7 +6607,7 @@
               </a14:hiddenLine>
             </a:ext>
             <a:ext uri="{AF507438-7753-43E0-B8FC-AC1667EBCBE1}">
-              <a14:hiddenEffects xmlns:a14="http://schemas.microsoft.com/office/drawing/2010/main">
+              <a14:hiddenEffects xmlns:a14="http://schemas.microsoft.com/office/drawing/2010/main" xmlns="">
                 <a:effectLst>
                   <a:outerShdw dist="35921" dir="2700000" algn="ctr" rotWithShape="0">
                     <a:srgbClr val="808080"/>
@@ -6750,7 +6750,7 @@
           <a:effectLst/>
           <a:extLst>
             <a:ext uri="{909E8E84-426E-40DD-AFC4-6F175D3DCCD1}">
-              <a14:hiddenFill xmlns:a14="http://schemas.microsoft.com/office/drawing/2010/main">
+              <a14:hiddenFill xmlns:a14="http://schemas.microsoft.com/office/drawing/2010/main" xmlns="">
                 <a:solidFill>
                   <a:schemeClr val="accent1">
                     <a:alpha val="50195"/>
@@ -6759,7 +6759,7 @@
               </a14:hiddenFill>
             </a:ext>
             <a:ext uri="{91240B29-F687-4F45-9708-019B960494DF}">
-              <a14:hiddenLine xmlns:a14="http://schemas.microsoft.com/office/drawing/2010/main" w="9525">
+              <a14:hiddenLine xmlns:a14="http://schemas.microsoft.com/office/drawing/2010/main" xmlns="" w="9525">
                 <a:solidFill>
                   <a:schemeClr val="tx1"/>
                 </a:solidFill>
@@ -6769,7 +6769,7 @@
               </a14:hiddenLine>
             </a:ext>
             <a:ext uri="{AF507438-7753-43E0-B8FC-AC1667EBCBE1}">
-              <a14:hiddenEffects xmlns:a14="http://schemas.microsoft.com/office/drawing/2010/main">
+              <a14:hiddenEffects xmlns:a14="http://schemas.microsoft.com/office/drawing/2010/main" xmlns="">
                 <a:effectLst>
                   <a:outerShdw dist="35921" dir="2700000" algn="ctr" rotWithShape="0">
                     <a:srgbClr val="808080"/>
@@ -6912,7 +6912,7 @@
           <a:effectLst/>
           <a:extLst>
             <a:ext uri="{909E8E84-426E-40DD-AFC4-6F175D3DCCD1}">
-              <a14:hiddenFill xmlns:a14="http://schemas.microsoft.com/office/drawing/2010/main">
+              <a14:hiddenFill xmlns:a14="http://schemas.microsoft.com/office/drawing/2010/main" xmlns="">
                 <a:gradFill rotWithShape="0">
                   <a:gsLst>
                     <a:gs pos="0">
@@ -6938,7 +6938,7 @@
               </a14:hiddenFill>
             </a:ext>
             <a:ext uri="{91240B29-F687-4F45-9708-019B960494DF}">
-              <a14:hiddenLine xmlns:a14="http://schemas.microsoft.com/office/drawing/2010/main" w="9525">
+              <a14:hiddenLine xmlns:a14="http://schemas.microsoft.com/office/drawing/2010/main" xmlns="" w="9525">
                 <a:solidFill>
                   <a:schemeClr val="tx1"/>
                 </a:solidFill>
@@ -6948,7 +6948,7 @@
               </a14:hiddenLine>
             </a:ext>
             <a:ext uri="{AF507438-7753-43E0-B8FC-AC1667EBCBE1}">
-              <a14:hiddenEffects xmlns:a14="http://schemas.microsoft.com/office/drawing/2010/main">
+              <a14:hiddenEffects xmlns:a14="http://schemas.microsoft.com/office/drawing/2010/main" xmlns="">
                 <a:effectLst>
                   <a:outerShdw dist="35921" dir="2700000" algn="ctr" rotWithShape="0">
                     <a:srgbClr val="808080"/>
@@ -6994,7 +6994,7 @@
           <a:effectLst/>
           <a:extLst>
             <a:ext uri="{909E8E84-426E-40DD-AFC4-6F175D3DCCD1}">
-              <a14:hiddenFill xmlns:a14="http://schemas.microsoft.com/office/drawing/2010/main">
+              <a14:hiddenFill xmlns:a14="http://schemas.microsoft.com/office/drawing/2010/main" xmlns="">
                 <a:gradFill rotWithShape="0">
                   <a:gsLst>
                     <a:gs pos="0">
@@ -7009,7 +7009,7 @@
               </a14:hiddenFill>
             </a:ext>
             <a:ext uri="{91240B29-F687-4F45-9708-019B960494DF}">
-              <a14:hiddenLine xmlns:a14="http://schemas.microsoft.com/office/drawing/2010/main" w="9525">
+              <a14:hiddenLine xmlns:a14="http://schemas.microsoft.com/office/drawing/2010/main" xmlns="" w="9525">
                 <a:solidFill>
                   <a:schemeClr val="tx1"/>
                 </a:solidFill>
@@ -7019,7 +7019,7 @@
               </a14:hiddenLine>
             </a:ext>
             <a:ext uri="{AF507438-7753-43E0-B8FC-AC1667EBCBE1}">
-              <a14:hiddenEffects xmlns:a14="http://schemas.microsoft.com/office/drawing/2010/main">
+              <a14:hiddenEffects xmlns:a14="http://schemas.microsoft.com/office/drawing/2010/main" xmlns="">
                 <a:effectLst>
                   <a:outerShdw dist="35921" dir="2700000" algn="ctr" rotWithShape="0">
                     <a:srgbClr val="808080"/>
@@ -7162,14 +7162,14 @@
           <a:effectLst/>
           <a:extLst>
             <a:ext uri="{909E8E84-426E-40DD-AFC4-6F175D3DCCD1}">
-              <a14:hiddenFill xmlns:a14="http://schemas.microsoft.com/office/drawing/2010/main">
+              <a14:hiddenFill xmlns:a14="http://schemas.microsoft.com/office/drawing/2010/main" xmlns="">
                 <a:solidFill>
                   <a:schemeClr val="accent1"/>
                 </a:solidFill>
               </a14:hiddenFill>
             </a:ext>
             <a:ext uri="{91240B29-F687-4F45-9708-019B960494DF}">
-              <a14:hiddenLine xmlns:a14="http://schemas.microsoft.com/office/drawing/2010/main" w="9525">
+              <a14:hiddenLine xmlns:a14="http://schemas.microsoft.com/office/drawing/2010/main" xmlns="" w="9525">
                 <a:solidFill>
                   <a:schemeClr val="tx1"/>
                 </a:solidFill>
@@ -7179,7 +7179,7 @@
               </a14:hiddenLine>
             </a:ext>
             <a:ext uri="{AF507438-7753-43E0-B8FC-AC1667EBCBE1}">
-              <a14:hiddenEffects xmlns:a14="http://schemas.microsoft.com/office/drawing/2010/main">
+              <a14:hiddenEffects xmlns:a14="http://schemas.microsoft.com/office/drawing/2010/main" xmlns="">
                 <a:effectLst>
                   <a:outerShdw dist="35921" dir="2700000" algn="ctr" rotWithShape="0">
                     <a:schemeClr val="bg2"/>
@@ -7350,12 +7350,12 @@
           <a:effectLst/>
           <a:extLst>
             <a:ext uri="{909E8E84-426E-40DD-AFC4-6F175D3DCCD1}">
-              <a14:hiddenFill xmlns:a14="http://schemas.microsoft.com/office/drawing/2010/main">
+              <a14:hiddenFill xmlns:a14="http://schemas.microsoft.com/office/drawing/2010/main" xmlns="">
                 <a:noFill/>
               </a14:hiddenFill>
             </a:ext>
             <a:ext uri="{AF507438-7753-43E0-B8FC-AC1667EBCBE1}">
-              <a14:hiddenEffects xmlns:a14="http://schemas.microsoft.com/office/drawing/2010/main">
+              <a14:hiddenEffects xmlns:a14="http://schemas.microsoft.com/office/drawing/2010/main" xmlns="">
                 <a:effectLst>
                   <a:outerShdw dist="35921" dir="2700000" algn="ctr" rotWithShape="0">
                     <a:schemeClr val="bg2"/>
@@ -7385,7 +7385,7 @@
           <a:blip r:embed="rId17" cstate="print">
             <a:extLst>
               <a:ext uri="{28A0092B-C50C-407E-A947-70E740481C1C}">
-                <a14:useLocalDpi xmlns:a14="http://schemas.microsoft.com/office/drawing/2010/main"/>
+                <a14:useLocalDpi xmlns:a14="http://schemas.microsoft.com/office/drawing/2010/main" xmlns=""/>
               </a:ext>
             </a:extLst>
           </a:blip>
@@ -7408,14 +7408,14 @@
           </a:ln>
           <a:extLst>
             <a:ext uri="{909E8E84-426E-40DD-AFC4-6F175D3DCCD1}">
-              <a14:hiddenFill xmlns:a14="http://schemas.microsoft.com/office/drawing/2010/main">
+              <a14:hiddenFill xmlns:a14="http://schemas.microsoft.com/office/drawing/2010/main" xmlns="">
                 <a:solidFill>
                   <a:srgbClr val="FFFFFF"/>
                 </a:solidFill>
               </a14:hiddenFill>
             </a:ext>
             <a:ext uri="{91240B29-F687-4F45-9708-019B960494DF}">
-              <a14:hiddenLine xmlns:a14="http://schemas.microsoft.com/office/drawing/2010/main" w="9525">
+              <a14:hiddenLine xmlns:a14="http://schemas.microsoft.com/office/drawing/2010/main" xmlns="" w="9525">
                 <a:solidFill>
                   <a:srgbClr val="000000"/>
                 </a:solidFill>
@@ -7450,14 +7450,14 @@
           <a:effectLst/>
           <a:extLst>
             <a:ext uri="{909E8E84-426E-40DD-AFC4-6F175D3DCCD1}">
-              <a14:hiddenFill xmlns:a14="http://schemas.microsoft.com/office/drawing/2010/main">
+              <a14:hiddenFill xmlns:a14="http://schemas.microsoft.com/office/drawing/2010/main" xmlns="">
                 <a:solidFill>
                   <a:schemeClr val="accent1"/>
                 </a:solidFill>
               </a14:hiddenFill>
             </a:ext>
             <a:ext uri="{91240B29-F687-4F45-9708-019B960494DF}">
-              <a14:hiddenLine xmlns:a14="http://schemas.microsoft.com/office/drawing/2010/main" w="12700" cap="sq">
+              <a14:hiddenLine xmlns:a14="http://schemas.microsoft.com/office/drawing/2010/main" xmlns="" w="12700" cap="sq">
                 <a:solidFill>
                   <a:schemeClr val="tx1"/>
                 </a:solidFill>
@@ -7467,7 +7467,7 @@
               </a14:hiddenLine>
             </a:ext>
             <a:ext uri="{AF507438-7753-43E0-B8FC-AC1667EBCBE1}">
-              <a14:hiddenEffects xmlns:a14="http://schemas.microsoft.com/office/drawing/2010/main">
+              <a14:hiddenEffects xmlns:a14="http://schemas.microsoft.com/office/drawing/2010/main" xmlns="">
                 <a:effectLst>
                   <a:outerShdw dist="35921" dir="2700000" algn="ctr" rotWithShape="0">
                     <a:schemeClr val="bg2"/>
@@ -8242,7 +8242,7 @@
     </p:spTree>
     <p:extLst>
       <p:ext uri="{BB962C8B-B14F-4D97-AF65-F5344CB8AC3E}">
-        <p14:creationId xmlns:p14="http://schemas.microsoft.com/office/powerpoint/2010/main" val="2471807738"/>
+        <p14:creationId xmlns:p14="http://schemas.microsoft.com/office/powerpoint/2010/main" xmlns="" val="2471807738"/>
       </p:ext>
     </p:extLst>
   </p:cSld>
@@ -8390,7 +8390,7 @@
           <p:cNvPr id="4" name="Rechteck 3">
             <a:extLst>
               <a:ext uri="{FF2B5EF4-FFF2-40B4-BE49-F238E27FC236}">
-                <a16:creationId xmlns:a16="http://schemas.microsoft.com/office/drawing/2014/main" id="{A8F1EAFF-81F9-46BE-A6E3-C80250CA2C15}"/>
+                <a16:creationId xmlns:a16="http://schemas.microsoft.com/office/drawing/2014/main" xmlns="" id="{A8F1EAFF-81F9-46BE-A6E3-C80250CA2C15}"/>
               </a:ext>
             </a:extLst>
           </p:cNvPr>
@@ -8462,7 +8462,7 @@
           <p:cNvPr id="5" name="Grafik 4">
             <a:extLst>
               <a:ext uri="{FF2B5EF4-FFF2-40B4-BE49-F238E27FC236}">
-                <a16:creationId xmlns:a16="http://schemas.microsoft.com/office/drawing/2014/main" id="{B7A73249-E718-4181-B152-435AB589D061}"/>
+                <a16:creationId xmlns:a16="http://schemas.microsoft.com/office/drawing/2014/main" xmlns="" id="{B7A73249-E718-4181-B152-435AB589D061}"/>
               </a:ext>
             </a:extLst>
           </p:cNvPr>
@@ -8492,7 +8492,7 @@
           <p:cNvPr id="6" name="Textfeld 5">
             <a:extLst>
               <a:ext uri="{FF2B5EF4-FFF2-40B4-BE49-F238E27FC236}">
-                <a16:creationId xmlns:a16="http://schemas.microsoft.com/office/drawing/2014/main" id="{5B45607A-F214-407A-9C26-5A43C7A3B5CA}"/>
+                <a16:creationId xmlns:a16="http://schemas.microsoft.com/office/drawing/2014/main" xmlns="" id="{5B45607A-F214-407A-9C26-5A43C7A3B5CA}"/>
               </a:ext>
             </a:extLst>
           </p:cNvPr>
@@ -8548,7 +8548,7 @@
     </p:spTree>
     <p:extLst>
       <p:ext uri="{BB962C8B-B14F-4D97-AF65-F5344CB8AC3E}">
-        <p14:creationId xmlns:p14="http://schemas.microsoft.com/office/powerpoint/2010/main" val="3453180570"/>
+        <p14:creationId xmlns:p14="http://schemas.microsoft.com/office/powerpoint/2010/main" xmlns="" val="3453180570"/>
       </p:ext>
     </p:extLst>
   </p:cSld>
@@ -8674,7 +8674,7 @@
           <p:cNvPr id="4" name="Rechteck 3">
             <a:extLst>
               <a:ext uri="{FF2B5EF4-FFF2-40B4-BE49-F238E27FC236}">
-                <a16:creationId xmlns:a16="http://schemas.microsoft.com/office/drawing/2014/main" id="{A8F1EAFF-81F9-46BE-A6E3-C80250CA2C15}"/>
+                <a16:creationId xmlns:a16="http://schemas.microsoft.com/office/drawing/2014/main" xmlns="" id="{A8F1EAFF-81F9-46BE-A6E3-C80250CA2C15}"/>
               </a:ext>
             </a:extLst>
           </p:cNvPr>
@@ -8746,7 +8746,7 @@
           <p:cNvPr id="5" name="Grafik 4">
             <a:extLst>
               <a:ext uri="{FF2B5EF4-FFF2-40B4-BE49-F238E27FC236}">
-                <a16:creationId xmlns:a16="http://schemas.microsoft.com/office/drawing/2014/main" id="{1F81ABDB-6C6F-401C-A48C-055154843AEC}"/>
+                <a16:creationId xmlns:a16="http://schemas.microsoft.com/office/drawing/2014/main" xmlns="" id="{1F81ABDB-6C6F-401C-A48C-055154843AEC}"/>
               </a:ext>
             </a:extLst>
           </p:cNvPr>
@@ -8774,7 +8774,7 @@
     </p:spTree>
     <p:extLst>
       <p:ext uri="{BB962C8B-B14F-4D97-AF65-F5344CB8AC3E}">
-        <p14:creationId xmlns:p14="http://schemas.microsoft.com/office/powerpoint/2010/main" val="2600437487"/>
+        <p14:creationId xmlns:p14="http://schemas.microsoft.com/office/powerpoint/2010/main" xmlns="" val="2600437487"/>
       </p:ext>
     </p:extLst>
   </p:cSld>
@@ -8874,7 +8874,7 @@
           <p:cNvPr id="4" name="Rechteck 3">
             <a:extLst>
               <a:ext uri="{FF2B5EF4-FFF2-40B4-BE49-F238E27FC236}">
-                <a16:creationId xmlns:a16="http://schemas.microsoft.com/office/drawing/2014/main" id="{A8F1EAFF-81F9-46BE-A6E3-C80250CA2C15}"/>
+                <a16:creationId xmlns:a16="http://schemas.microsoft.com/office/drawing/2014/main" xmlns="" id="{A8F1EAFF-81F9-46BE-A6E3-C80250CA2C15}"/>
               </a:ext>
             </a:extLst>
           </p:cNvPr>
@@ -8946,7 +8946,7 @@
           <p:cNvPr id="5" name="Grafik 4">
             <a:extLst>
               <a:ext uri="{FF2B5EF4-FFF2-40B4-BE49-F238E27FC236}">
-                <a16:creationId xmlns:a16="http://schemas.microsoft.com/office/drawing/2014/main" id="{B133FF5A-21CA-4DAF-B55E-B170E4A3E037}"/>
+                <a16:creationId xmlns:a16="http://schemas.microsoft.com/office/drawing/2014/main" xmlns="" id="{B133FF5A-21CA-4DAF-B55E-B170E4A3E037}"/>
               </a:ext>
             </a:extLst>
           </p:cNvPr>
@@ -8976,7 +8976,7 @@
           <p:cNvPr id="6" name="Textfeld 5">
             <a:extLst>
               <a:ext uri="{FF2B5EF4-FFF2-40B4-BE49-F238E27FC236}">
-                <a16:creationId xmlns:a16="http://schemas.microsoft.com/office/drawing/2014/main" id="{BF288E82-568E-463F-B5E9-9875063309CB}"/>
+                <a16:creationId xmlns:a16="http://schemas.microsoft.com/office/drawing/2014/main" xmlns="" id="{BF288E82-568E-463F-B5E9-9875063309CB}"/>
               </a:ext>
             </a:extLst>
           </p:cNvPr>
@@ -9019,7 +9019,7 @@
     </p:spTree>
     <p:extLst>
       <p:ext uri="{BB962C8B-B14F-4D97-AF65-F5344CB8AC3E}">
-        <p14:creationId xmlns:p14="http://schemas.microsoft.com/office/powerpoint/2010/main" val="1076111320"/>
+        <p14:creationId xmlns:p14="http://schemas.microsoft.com/office/powerpoint/2010/main" xmlns="" val="1076111320"/>
       </p:ext>
     </p:extLst>
   </p:cSld>
@@ -9083,20 +9083,41 @@
             <a:pPr lvl="1"/>
             <a:r>
               <a:rPr lang="de-DE" dirty="0"/>
-              <a:t>Schneller</a:t>
-            </a:r>
+              <a:t>s</a:t>
+            </a:r>
+            <a:r>
+              <a:rPr lang="de-DE" dirty="0" smtClean="0"/>
+              <a:t>chneller</a:t>
+            </a:r>
+            <a:endParaRPr lang="de-DE" dirty="0"/>
           </a:p>
           <a:p>
             <a:pPr lvl="1"/>
             <a:r>
               <a:rPr lang="de-DE" dirty="0"/>
-              <a:t>Sofort richtige Unterstützung</a:t>
-            </a:r>
-          </a:p>
-          <a:p>
-            <a:r>
-              <a:rPr lang="de-DE" dirty="0"/>
-              <a:t>Mehr Zeit für Service Mitarbeiter zur Konzentration auf Bereich, in dem Beratung wirklich wichtig ist</a:t>
+              <a:t>s</a:t>
+            </a:r>
+            <a:r>
+              <a:rPr lang="de-DE" dirty="0" smtClean="0"/>
+              <a:t>ofort </a:t>
+            </a:r>
+            <a:r>
+              <a:rPr lang="de-DE" dirty="0"/>
+              <a:t>richtige Unterstützung</a:t>
+            </a:r>
+          </a:p>
+          <a:p>
+            <a:r>
+              <a:rPr lang="de-DE" dirty="0"/>
+              <a:t>Mehr Zeit für </a:t>
+            </a:r>
+            <a:r>
+              <a:rPr lang="de-DE" dirty="0" smtClean="0"/>
+              <a:t>Service-Mitarbeiter </a:t>
+            </a:r>
+            <a:r>
+              <a:rPr lang="de-DE" dirty="0"/>
+              <a:t>zur Konzentration auf Bereich, in dem Beratung wirklich wichtig ist</a:t>
             </a:r>
           </a:p>
         </p:txBody>
@@ -9128,7 +9149,7 @@
           <p:cNvPr id="4" name="Rechteck 3">
             <a:extLst>
               <a:ext uri="{FF2B5EF4-FFF2-40B4-BE49-F238E27FC236}">
-                <a16:creationId xmlns:a16="http://schemas.microsoft.com/office/drawing/2014/main" id="{A8F1EAFF-81F9-46BE-A6E3-C80250CA2C15}"/>
+                <a16:creationId xmlns:a16="http://schemas.microsoft.com/office/drawing/2014/main" xmlns="" id="{A8F1EAFF-81F9-46BE-A6E3-C80250CA2C15}"/>
               </a:ext>
             </a:extLst>
           </p:cNvPr>
@@ -9200,7 +9221,7 @@
           <p:cNvPr id="5" name="Pfeil: nach rechts 4">
             <a:extLst>
               <a:ext uri="{FF2B5EF4-FFF2-40B4-BE49-F238E27FC236}">
-                <a16:creationId xmlns:a16="http://schemas.microsoft.com/office/drawing/2014/main" id="{6325FBC0-810B-4431-AFFF-654D1B0BE748}"/>
+                <a16:creationId xmlns:a16="http://schemas.microsoft.com/office/drawing/2014/main" xmlns="" id="{6325FBC0-810B-4431-AFFF-654D1B0BE748}"/>
               </a:ext>
             </a:extLst>
           </p:cNvPr>
@@ -9272,7 +9293,7 @@
           <p:cNvPr id="6" name="Textfeld 5">
             <a:extLst>
               <a:ext uri="{FF2B5EF4-FFF2-40B4-BE49-F238E27FC236}">
-                <a16:creationId xmlns:a16="http://schemas.microsoft.com/office/drawing/2014/main" id="{3039A5C6-EF6D-467B-9687-4F8B834F44E5}"/>
+                <a16:creationId xmlns:a16="http://schemas.microsoft.com/office/drawing/2014/main" xmlns="" id="{3039A5C6-EF6D-467B-9687-4F8B834F44E5}"/>
               </a:ext>
             </a:extLst>
           </p:cNvPr>
@@ -9320,7 +9341,7 @@
     </p:spTree>
     <p:extLst>
       <p:ext uri="{BB962C8B-B14F-4D97-AF65-F5344CB8AC3E}">
-        <p14:creationId xmlns:p14="http://schemas.microsoft.com/office/powerpoint/2010/main" val="2338103705"/>
+        <p14:creationId xmlns:p14="http://schemas.microsoft.com/office/powerpoint/2010/main" xmlns="" val="2338103705"/>
       </p:ext>
     </p:extLst>
   </p:cSld>
@@ -9435,7 +9456,7 @@
           <p:cNvPr id="4" name="Rechteck 3">
             <a:extLst>
               <a:ext uri="{FF2B5EF4-FFF2-40B4-BE49-F238E27FC236}">
-                <a16:creationId xmlns:a16="http://schemas.microsoft.com/office/drawing/2014/main" id="{A8F1EAFF-81F9-46BE-A6E3-C80250CA2C15}"/>
+                <a16:creationId xmlns:a16="http://schemas.microsoft.com/office/drawing/2014/main" xmlns="" id="{A8F1EAFF-81F9-46BE-A6E3-C80250CA2C15}"/>
               </a:ext>
             </a:extLst>
           </p:cNvPr>
@@ -9505,7 +9526,7 @@
     </p:spTree>
     <p:extLst>
       <p:ext uri="{BB962C8B-B14F-4D97-AF65-F5344CB8AC3E}">
-        <p14:creationId xmlns:p14="http://schemas.microsoft.com/office/powerpoint/2010/main" val="4191362604"/>
+        <p14:creationId xmlns:p14="http://schemas.microsoft.com/office/powerpoint/2010/main" xmlns="" val="4191362604"/>
       </p:ext>
     </p:extLst>
   </p:cSld>
@@ -9655,7 +9676,7 @@
           <p:cNvPr id="4" name="Rechteck 3">
             <a:extLst>
               <a:ext uri="{FF2B5EF4-FFF2-40B4-BE49-F238E27FC236}">
-                <a16:creationId xmlns:a16="http://schemas.microsoft.com/office/drawing/2014/main" id="{A8F1EAFF-81F9-46BE-A6E3-C80250CA2C15}"/>
+                <a16:creationId xmlns:a16="http://schemas.microsoft.com/office/drawing/2014/main" xmlns="" id="{A8F1EAFF-81F9-46BE-A6E3-C80250CA2C15}"/>
               </a:ext>
             </a:extLst>
           </p:cNvPr>
@@ -9727,7 +9748,7 @@
           <p:cNvPr id="5" name="Grafik 4">
             <a:extLst>
               <a:ext uri="{FF2B5EF4-FFF2-40B4-BE49-F238E27FC236}">
-                <a16:creationId xmlns:a16="http://schemas.microsoft.com/office/drawing/2014/main" id="{3005A672-A76F-4A1A-86D0-9F7747892BEA}"/>
+                <a16:creationId xmlns:a16="http://schemas.microsoft.com/office/drawing/2014/main" xmlns="" id="{3005A672-A76F-4A1A-86D0-9F7747892BEA}"/>
               </a:ext>
             </a:extLst>
           </p:cNvPr>
@@ -9755,7 +9776,7 @@
     </p:spTree>
     <p:extLst>
       <p:ext uri="{BB962C8B-B14F-4D97-AF65-F5344CB8AC3E}">
-        <p14:creationId xmlns:p14="http://schemas.microsoft.com/office/powerpoint/2010/main" val="3702819348"/>
+        <p14:creationId xmlns:p14="http://schemas.microsoft.com/office/powerpoint/2010/main" xmlns="" val="3702819348"/>
       </p:ext>
     </p:extLst>
   </p:cSld>
@@ -9857,7 +9878,7 @@
           <p:cNvPr id="4" name="Rechteck 3">
             <a:extLst>
               <a:ext uri="{FF2B5EF4-FFF2-40B4-BE49-F238E27FC236}">
-                <a16:creationId xmlns:a16="http://schemas.microsoft.com/office/drawing/2014/main" id="{A8F1EAFF-81F9-46BE-A6E3-C80250CA2C15}"/>
+                <a16:creationId xmlns:a16="http://schemas.microsoft.com/office/drawing/2014/main" xmlns="" id="{A8F1EAFF-81F9-46BE-A6E3-C80250CA2C15}"/>
               </a:ext>
             </a:extLst>
           </p:cNvPr>
@@ -9927,7 +9948,7 @@
     </p:spTree>
     <p:extLst>
       <p:ext uri="{BB962C8B-B14F-4D97-AF65-F5344CB8AC3E}">
-        <p14:creationId xmlns:p14="http://schemas.microsoft.com/office/powerpoint/2010/main" val="2678669058"/>
+        <p14:creationId xmlns:p14="http://schemas.microsoft.com/office/powerpoint/2010/main" xmlns="" val="2678669058"/>
       </p:ext>
     </p:extLst>
   </p:cSld>
@@ -10045,7 +10066,7 @@
           <p:cNvPr id="4" name="Rechteck 3">
             <a:extLst>
               <a:ext uri="{FF2B5EF4-FFF2-40B4-BE49-F238E27FC236}">
-                <a16:creationId xmlns:a16="http://schemas.microsoft.com/office/drawing/2014/main" id="{A8F1EAFF-81F9-46BE-A6E3-C80250CA2C15}"/>
+                <a16:creationId xmlns:a16="http://schemas.microsoft.com/office/drawing/2014/main" xmlns="" id="{A8F1EAFF-81F9-46BE-A6E3-C80250CA2C15}"/>
               </a:ext>
             </a:extLst>
           </p:cNvPr>
@@ -10117,7 +10138,7 @@
           <p:cNvPr id="5" name="Inhaltsplatzhalter 1">
             <a:extLst>
               <a:ext uri="{FF2B5EF4-FFF2-40B4-BE49-F238E27FC236}">
-                <a16:creationId xmlns:a16="http://schemas.microsoft.com/office/drawing/2014/main" id="{927EC87E-DE56-4D9F-A327-DAD85ABC5E29}"/>
+                <a16:creationId xmlns:a16="http://schemas.microsoft.com/office/drawing/2014/main" xmlns="" id="{927EC87E-DE56-4D9F-A327-DAD85ABC5E29}"/>
               </a:ext>
             </a:extLst>
           </p:cNvPr>
@@ -10340,7 +10361,7 @@
           <p:cNvPr id="6" name="Pfeil: nach rechts 5">
             <a:extLst>
               <a:ext uri="{FF2B5EF4-FFF2-40B4-BE49-F238E27FC236}">
-                <a16:creationId xmlns:a16="http://schemas.microsoft.com/office/drawing/2014/main" id="{F56DC0D9-A7B6-4951-AAD4-70F8A7B68A5C}"/>
+                <a16:creationId xmlns:a16="http://schemas.microsoft.com/office/drawing/2014/main" xmlns="" id="{F56DC0D9-A7B6-4951-AAD4-70F8A7B68A5C}"/>
               </a:ext>
             </a:extLst>
           </p:cNvPr>
@@ -10410,7 +10431,7 @@
     </p:spTree>
     <p:extLst>
       <p:ext uri="{BB962C8B-B14F-4D97-AF65-F5344CB8AC3E}">
-        <p14:creationId xmlns:p14="http://schemas.microsoft.com/office/powerpoint/2010/main" val="3670895514"/>
+        <p14:creationId xmlns:p14="http://schemas.microsoft.com/office/powerpoint/2010/main" xmlns="" val="3670895514"/>
       </p:ext>
     </p:extLst>
   </p:cSld>
@@ -10480,12 +10501,20 @@
           </a:p>
           <a:p>
             <a:r>
-              <a:rPr lang="de-DE" sz="2000" dirty="0" err="1"/>
+              <a:rPr lang="de-DE" sz="2000" dirty="0" err="1" smtClean="0"/>
               <a:t>Self</a:t>
             </a:r>
             <a:r>
               <a:rPr lang="de-DE" sz="2000" dirty="0"/>
-              <a:t> Help Anleitungen</a:t>
+              <a:t>-</a:t>
+            </a:r>
+            <a:r>
+              <a:rPr lang="de-DE" sz="2000" dirty="0" smtClean="0"/>
+              <a:t>Help </a:t>
+            </a:r>
+            <a:r>
+              <a:rPr lang="de-DE" sz="2000" dirty="0"/>
+              <a:t>Anleitungen</a:t>
             </a:r>
           </a:p>
           <a:p>
@@ -10529,7 +10558,7 @@
           <p:cNvPr id="4" name="Rechteck 3">
             <a:extLst>
               <a:ext uri="{FF2B5EF4-FFF2-40B4-BE49-F238E27FC236}">
-                <a16:creationId xmlns:a16="http://schemas.microsoft.com/office/drawing/2014/main" id="{A8F1EAFF-81F9-46BE-A6E3-C80250CA2C15}"/>
+                <a16:creationId xmlns:a16="http://schemas.microsoft.com/office/drawing/2014/main" xmlns="" id="{A8F1EAFF-81F9-46BE-A6E3-C80250CA2C15}"/>
               </a:ext>
             </a:extLst>
           </p:cNvPr>
@@ -10599,7 +10628,7 @@
     </p:spTree>
     <p:extLst>
       <p:ext uri="{BB962C8B-B14F-4D97-AF65-F5344CB8AC3E}">
-        <p14:creationId xmlns:p14="http://schemas.microsoft.com/office/powerpoint/2010/main" val="2622713193"/>
+        <p14:creationId xmlns:p14="http://schemas.microsoft.com/office/powerpoint/2010/main" xmlns="" val="2622713193"/>
       </p:ext>
     </p:extLst>
   </p:cSld>
@@ -10735,7 +10764,7 @@
           <p:cNvPr id="4" name="Rechteck 3">
             <a:extLst>
               <a:ext uri="{FF2B5EF4-FFF2-40B4-BE49-F238E27FC236}">
-                <a16:creationId xmlns:a16="http://schemas.microsoft.com/office/drawing/2014/main" id="{A8F1EAFF-81F9-46BE-A6E3-C80250CA2C15}"/>
+                <a16:creationId xmlns:a16="http://schemas.microsoft.com/office/drawing/2014/main" xmlns="" id="{A8F1EAFF-81F9-46BE-A6E3-C80250CA2C15}"/>
               </a:ext>
             </a:extLst>
           </p:cNvPr>
@@ -10805,7 +10834,7 @@
     </p:spTree>
     <p:extLst>
       <p:ext uri="{BB962C8B-B14F-4D97-AF65-F5344CB8AC3E}">
-        <p14:creationId xmlns:p14="http://schemas.microsoft.com/office/powerpoint/2010/main" val="122059793"/>
+        <p14:creationId xmlns:p14="http://schemas.microsoft.com/office/powerpoint/2010/main" xmlns="" val="122059793"/>
       </p:ext>
     </p:extLst>
   </p:cSld>
@@ -10912,7 +10941,7 @@
           <p:cNvPr id="4" name="Rechteck 3">
             <a:extLst>
               <a:ext uri="{FF2B5EF4-FFF2-40B4-BE49-F238E27FC236}">
-                <a16:creationId xmlns:a16="http://schemas.microsoft.com/office/drawing/2014/main" id="{A8F1EAFF-81F9-46BE-A6E3-C80250CA2C15}"/>
+                <a16:creationId xmlns:a16="http://schemas.microsoft.com/office/drawing/2014/main" xmlns="" id="{A8F1EAFF-81F9-46BE-A6E3-C80250CA2C15}"/>
               </a:ext>
             </a:extLst>
           </p:cNvPr>
@@ -10984,7 +11013,7 @@
           <p:cNvPr id="1026" name="Picture 2" descr="Geld senden per Smartphone: Volksbanken machen mit bei Kwitt">
             <a:extLst>
               <a:ext uri="{FF2B5EF4-FFF2-40B4-BE49-F238E27FC236}">
-                <a16:creationId xmlns:a16="http://schemas.microsoft.com/office/drawing/2014/main" id="{0EE2C0E9-3F81-4F3A-B640-1A0E4F7CCEDE}"/>
+                <a16:creationId xmlns:a16="http://schemas.microsoft.com/office/drawing/2014/main" xmlns="" id="{0EE2C0E9-3F81-4F3A-B640-1A0E4F7CCEDE}"/>
               </a:ext>
             </a:extLst>
           </p:cNvPr>
@@ -10997,7 +11026,7 @@
           <a:blip r:embed="rId2" cstate="print">
             <a:extLst>
               <a:ext uri="{28A0092B-C50C-407E-A947-70E740481C1C}">
-                <a14:useLocalDpi xmlns:a14="http://schemas.microsoft.com/office/drawing/2010/main" val="0"/>
+                <a14:useLocalDpi xmlns:a14="http://schemas.microsoft.com/office/drawing/2010/main" xmlns="" val="0"/>
               </a:ext>
             </a:extLst>
           </a:blip>
@@ -11017,7 +11046,7 @@
           <a:noFill/>
           <a:extLst>
             <a:ext uri="{909E8E84-426E-40DD-AFC4-6F175D3DCCD1}">
-              <a14:hiddenFill xmlns:a14="http://schemas.microsoft.com/office/drawing/2010/main">
+              <a14:hiddenFill xmlns:a14="http://schemas.microsoft.com/office/drawing/2010/main" xmlns="">
                 <a:solidFill>
                   <a:srgbClr val="FFFFFF"/>
                 </a:solidFill>
@@ -11031,7 +11060,7 @@
           <p:cNvPr id="5" name="Textfeld 4">
             <a:extLst>
               <a:ext uri="{FF2B5EF4-FFF2-40B4-BE49-F238E27FC236}">
-                <a16:creationId xmlns:a16="http://schemas.microsoft.com/office/drawing/2014/main" id="{EEF1C673-D6CD-4F22-A965-8861A7BBEACC}"/>
+                <a16:creationId xmlns:a16="http://schemas.microsoft.com/office/drawing/2014/main" xmlns="" id="{EEF1C673-D6CD-4F22-A965-8861A7BBEACC}"/>
               </a:ext>
             </a:extLst>
           </p:cNvPr>
@@ -11074,7 +11103,7 @@
     </p:spTree>
     <p:extLst>
       <p:ext uri="{BB962C8B-B14F-4D97-AF65-F5344CB8AC3E}">
-        <p14:creationId xmlns:p14="http://schemas.microsoft.com/office/powerpoint/2010/main" val="1598296486"/>
+        <p14:creationId xmlns:p14="http://schemas.microsoft.com/office/powerpoint/2010/main" xmlns="" val="1598296486"/>
       </p:ext>
     </p:extLst>
   </p:cSld>
@@ -11214,7 +11243,7 @@
           <p:cNvPr id="4" name="Rechteck 3">
             <a:extLst>
               <a:ext uri="{FF2B5EF4-FFF2-40B4-BE49-F238E27FC236}">
-                <a16:creationId xmlns:a16="http://schemas.microsoft.com/office/drawing/2014/main" id="{A8F1EAFF-81F9-46BE-A6E3-C80250CA2C15}"/>
+                <a16:creationId xmlns:a16="http://schemas.microsoft.com/office/drawing/2014/main" xmlns="" id="{A8F1EAFF-81F9-46BE-A6E3-C80250CA2C15}"/>
               </a:ext>
             </a:extLst>
           </p:cNvPr>
@@ -11286,7 +11315,7 @@
           <p:cNvPr id="2052" name="Picture 4" descr="Bildergebnis fÃ¼r tobi vodafone">
             <a:extLst>
               <a:ext uri="{FF2B5EF4-FFF2-40B4-BE49-F238E27FC236}">
-                <a16:creationId xmlns:a16="http://schemas.microsoft.com/office/drawing/2014/main" id="{02FC9656-A4F8-4AC4-88B5-7E34A8341ABE}"/>
+                <a16:creationId xmlns:a16="http://schemas.microsoft.com/office/drawing/2014/main" xmlns="" id="{02FC9656-A4F8-4AC4-88B5-7E34A8341ABE}"/>
               </a:ext>
             </a:extLst>
           </p:cNvPr>
@@ -11299,7 +11328,7 @@
           <a:blip r:embed="rId2" cstate="print">
             <a:extLst>
               <a:ext uri="{28A0092B-C50C-407E-A947-70E740481C1C}">
-                <a14:useLocalDpi xmlns:a14="http://schemas.microsoft.com/office/drawing/2010/main" val="0"/>
+                <a14:useLocalDpi xmlns:a14="http://schemas.microsoft.com/office/drawing/2010/main" xmlns="" val="0"/>
               </a:ext>
             </a:extLst>
           </a:blip>
@@ -11319,7 +11348,7 @@
           <a:noFill/>
           <a:extLst>
             <a:ext uri="{909E8E84-426E-40DD-AFC4-6F175D3DCCD1}">
-              <a14:hiddenFill xmlns:a14="http://schemas.microsoft.com/office/drawing/2010/main">
+              <a14:hiddenFill xmlns:a14="http://schemas.microsoft.com/office/drawing/2010/main" xmlns="">
                 <a:solidFill>
                   <a:srgbClr val="FFFFFF"/>
                 </a:solidFill>
@@ -11333,7 +11362,7 @@
           <p:cNvPr id="7" name="Textfeld 6">
             <a:extLst>
               <a:ext uri="{FF2B5EF4-FFF2-40B4-BE49-F238E27FC236}">
-                <a16:creationId xmlns:a16="http://schemas.microsoft.com/office/drawing/2014/main" id="{7CA3D2A1-C1A1-486B-B8D3-4199331184B5}"/>
+                <a16:creationId xmlns:a16="http://schemas.microsoft.com/office/drawing/2014/main" xmlns="" id="{7CA3D2A1-C1A1-486B-B8D3-4199331184B5}"/>
               </a:ext>
             </a:extLst>
           </p:cNvPr>
@@ -11376,7 +11405,7 @@
     </p:spTree>
     <p:extLst>
       <p:ext uri="{BB962C8B-B14F-4D97-AF65-F5344CB8AC3E}">
-        <p14:creationId xmlns:p14="http://schemas.microsoft.com/office/powerpoint/2010/main" val="2697652364"/>
+        <p14:creationId xmlns:p14="http://schemas.microsoft.com/office/powerpoint/2010/main" xmlns="" val="2697652364"/>
       </p:ext>
     </p:extLst>
   </p:cSld>
@@ -11637,7 +11666,7 @@
         <a:effectLst/>
         <a:extLst>
           <a:ext uri="{AF507438-7753-43E0-B8FC-AC1667EBCBE1}">
-            <a14:hiddenEffects xmlns:a14="http://schemas.microsoft.com/office/drawing/2010/main">
+            <a14:hiddenEffects xmlns:a14="http://schemas.microsoft.com/office/drawing/2010/main" xmlns="">
               <a:effectLst>
                 <a:outerShdw dist="35921" dir="2700000" algn="ctr" rotWithShape="0">
                   <a:schemeClr val="bg2"/>
@@ -11710,7 +11739,7 @@
         <a:effectLst/>
         <a:extLst>
           <a:ext uri="{AF507438-7753-43E0-B8FC-AC1667EBCBE1}">
-            <a14:hiddenEffects xmlns:a14="http://schemas.microsoft.com/office/drawing/2010/main">
+            <a14:hiddenEffects xmlns:a14="http://schemas.microsoft.com/office/drawing/2010/main" xmlns="">
               <a:effectLst>
                 <a:outerShdw dist="35921" dir="2700000" algn="ctr" rotWithShape="0">
                   <a:schemeClr val="bg2"/>
@@ -12154,7 +12183,7 @@
   <a:extraClrSchemeLst/>
   <a:extLst>
     <a:ext uri="{05A4C25C-085E-4340-85A3-A5531E510DB2}">
-      <thm15:themeFamily xmlns:thm15="http://schemas.microsoft.com/office/thememl/2012/main" name="Office Theme" id="{62F939B6-93AF-4DB8-9C6B-D6C7DFDC589F}" vid="{4A3C46E8-61CC-4603-A589-7422A47A8E4A}"/>
+      <thm15:themeFamily xmlns:thm15="http://schemas.microsoft.com/office/thememl/2012/main" xmlns="" name="Office Theme" id="{62F939B6-93AF-4DB8-9C6B-D6C7DFDC589F}" vid="{4A3C46E8-61CC-4603-A589-7422A47A8E4A}"/>
     </a:ext>
   </a:extLst>
 </a:theme>
@@ -12415,7 +12444,7 @@
   <a:extraClrSchemeLst/>
   <a:extLst>
     <a:ext uri="{05A4C25C-085E-4340-85A3-A5531E510DB2}">
-      <thm15:themeFamily xmlns:thm15="http://schemas.microsoft.com/office/thememl/2012/main" name="Office Theme" id="{62F939B6-93AF-4DB8-9C6B-D6C7DFDC589F}" vid="{4A3C46E8-61CC-4603-A589-7422A47A8E4A}"/>
+      <thm15:themeFamily xmlns:thm15="http://schemas.microsoft.com/office/thememl/2012/main" xmlns="" name="Office Theme" id="{62F939B6-93AF-4DB8-9C6B-D6C7DFDC589F}" vid="{4A3C46E8-61CC-4603-A589-7422A47A8E4A}"/>
     </a:ext>
   </a:extLst>
 </a:theme>

</xml_diff>